<commit_message>
Changes: - Documentation update for project portfolio page, user guide and developer guide - Update some UML diagrams for better formatting
</commit_message>
<xml_diff>
--- a/docs/diagrams/diary/AddPhotoParserSubroutines.pptx
+++ b/docs/diagrams/diary/AddPhotoParserSubroutines.pptx
@@ -105,6 +105,11 @@
       </a:defRPr>
     </a:lvl9pPr>
   </p:defaultTextStyle>
+  <p:extLst>
+    <p:ext uri="{EFAFB233-063F-42B5-8137-9DF3F51BA10A}">
+      <p15:sldGuideLst xmlns:p15="http://schemas.microsoft.com/office/powerpoint/2012/main"/>
+    </p:ext>
+  </p:extLst>
 </p:presentation>
 </file>
 
@@ -257,7 +262,7 @@
           <a:p>
             <a:fld id="{7CB9F90D-EB2B-4C65-8D27-D7118A69574C}" type="datetimeFigureOut">
               <a:rPr lang="en-GB" smtClean="0"/>
-              <a:t>24/10/2019</a:t>
+              <a:t>10/11/2019</a:t>
             </a:fld>
             <a:endParaRPr lang="en-GB"/>
           </a:p>
@@ -457,7 +462,7 @@
           <a:p>
             <a:fld id="{7CB9F90D-EB2B-4C65-8D27-D7118A69574C}" type="datetimeFigureOut">
               <a:rPr lang="en-GB" smtClean="0"/>
-              <a:t>24/10/2019</a:t>
+              <a:t>10/11/2019</a:t>
             </a:fld>
             <a:endParaRPr lang="en-GB"/>
           </a:p>
@@ -667,7 +672,7 @@
           <a:p>
             <a:fld id="{7CB9F90D-EB2B-4C65-8D27-D7118A69574C}" type="datetimeFigureOut">
               <a:rPr lang="en-GB" smtClean="0"/>
-              <a:t>24/10/2019</a:t>
+              <a:t>10/11/2019</a:t>
             </a:fld>
             <a:endParaRPr lang="en-GB"/>
           </a:p>
@@ -867,7 +872,7 @@
           <a:p>
             <a:fld id="{7CB9F90D-EB2B-4C65-8D27-D7118A69574C}" type="datetimeFigureOut">
               <a:rPr lang="en-GB" smtClean="0"/>
-              <a:t>24/10/2019</a:t>
+              <a:t>10/11/2019</a:t>
             </a:fld>
             <a:endParaRPr lang="en-GB"/>
           </a:p>
@@ -1143,7 +1148,7 @@
           <a:p>
             <a:fld id="{7CB9F90D-EB2B-4C65-8D27-D7118A69574C}" type="datetimeFigureOut">
               <a:rPr lang="en-GB" smtClean="0"/>
-              <a:t>24/10/2019</a:t>
+              <a:t>10/11/2019</a:t>
             </a:fld>
             <a:endParaRPr lang="en-GB"/>
           </a:p>
@@ -1411,7 +1416,7 @@
           <a:p>
             <a:fld id="{7CB9F90D-EB2B-4C65-8D27-D7118A69574C}" type="datetimeFigureOut">
               <a:rPr lang="en-GB" smtClean="0"/>
-              <a:t>24/10/2019</a:t>
+              <a:t>10/11/2019</a:t>
             </a:fld>
             <a:endParaRPr lang="en-GB"/>
           </a:p>
@@ -1826,7 +1831,7 @@
           <a:p>
             <a:fld id="{7CB9F90D-EB2B-4C65-8D27-D7118A69574C}" type="datetimeFigureOut">
               <a:rPr lang="en-GB" smtClean="0"/>
-              <a:t>24/10/2019</a:t>
+              <a:t>10/11/2019</a:t>
             </a:fld>
             <a:endParaRPr lang="en-GB"/>
           </a:p>
@@ -1968,7 +1973,7 @@
           <a:p>
             <a:fld id="{7CB9F90D-EB2B-4C65-8D27-D7118A69574C}" type="datetimeFigureOut">
               <a:rPr lang="en-GB" smtClean="0"/>
-              <a:t>24/10/2019</a:t>
+              <a:t>10/11/2019</a:t>
             </a:fld>
             <a:endParaRPr lang="en-GB"/>
           </a:p>
@@ -2081,7 +2086,7 @@
           <a:p>
             <a:fld id="{7CB9F90D-EB2B-4C65-8D27-D7118A69574C}" type="datetimeFigureOut">
               <a:rPr lang="en-GB" smtClean="0"/>
-              <a:t>24/10/2019</a:t>
+              <a:t>10/11/2019</a:t>
             </a:fld>
             <a:endParaRPr lang="en-GB"/>
           </a:p>
@@ -2394,7 +2399,7 @@
           <a:p>
             <a:fld id="{7CB9F90D-EB2B-4C65-8D27-D7118A69574C}" type="datetimeFigureOut">
               <a:rPr lang="en-GB" smtClean="0"/>
-              <a:t>24/10/2019</a:t>
+              <a:t>10/11/2019</a:t>
             </a:fld>
             <a:endParaRPr lang="en-GB"/>
           </a:p>
@@ -2683,7 +2688,7 @@
           <a:p>
             <a:fld id="{7CB9F90D-EB2B-4C65-8D27-D7118A69574C}" type="datetimeFigureOut">
               <a:rPr lang="en-GB" smtClean="0"/>
-              <a:t>24/10/2019</a:t>
+              <a:t>10/11/2019</a:t>
             </a:fld>
             <a:endParaRPr lang="en-GB"/>
           </a:p>
@@ -2926,7 +2931,7 @@
           <a:p>
             <a:fld id="{7CB9F90D-EB2B-4C65-8D27-D7118A69574C}" type="datetimeFigureOut">
               <a:rPr lang="en-GB" smtClean="0"/>
-              <a:t>24/10/2019</a:t>
+              <a:t>10/11/2019</a:t>
             </a:fld>
             <a:endParaRPr lang="en-GB"/>
           </a:p>
@@ -3499,7 +3504,7 @@
         </p:nvSpPr>
         <p:spPr>
           <a:xfrm>
-            <a:off x="11039199" y="6098929"/>
+            <a:off x="11449985" y="6098929"/>
             <a:ext cx="272561" cy="272561"/>
           </a:xfrm>
           <a:prstGeom prst="flowChartConnector">
@@ -3548,7 +3553,7 @@
         </p:nvSpPr>
         <p:spPr>
           <a:xfrm>
-            <a:off x="11075833" y="6132632"/>
+            <a:off x="11486619" y="6130600"/>
             <a:ext cx="199292" cy="205154"/>
           </a:xfrm>
           <a:prstGeom prst="flowChartConnector">
@@ -3983,7 +3988,7 @@
         </p:nvSpPr>
         <p:spPr>
           <a:xfrm>
-            <a:off x="6098436" y="5036115"/>
+            <a:off x="6103852" y="5036220"/>
             <a:ext cx="369277" cy="474785"/>
           </a:xfrm>
           <a:prstGeom prst="flowChartDecision">
@@ -4040,8 +4045,8 @@
         </p:nvCxnSpPr>
         <p:spPr>
           <a:xfrm>
-            <a:off x="6283075" y="5510900"/>
-            <a:ext cx="15040" cy="407787"/>
+            <a:off x="6288491" y="5511005"/>
+            <a:ext cx="9624" cy="407682"/>
           </a:xfrm>
           <a:prstGeom prst="straightConnector1">
             <a:avLst/>
@@ -4146,14 +4151,14 @@
           <p:cNvCxnSpPr>
             <a:cxnSpLocks/>
             <a:stCxn id="30" idx="3"/>
-            <a:endCxn id="9" idx="2"/>
+            <a:endCxn id="45" idx="1"/>
           </p:cNvCxnSpPr>
           <p:nvPr/>
         </p:nvCxnSpPr>
         <p:spPr>
-          <a:xfrm>
-            <a:off x="7212516" y="6235210"/>
-            <a:ext cx="3826683" cy="0"/>
+          <a:xfrm flipV="1">
+            <a:off x="7212516" y="6233178"/>
+            <a:ext cx="3437793" cy="2032"/>
           </a:xfrm>
           <a:prstGeom prst="straightConnector1">
             <a:avLst/>
@@ -4195,8 +4200,8 @@
         </p:nvCxnSpPr>
         <p:spPr>
           <a:xfrm flipH="1">
-            <a:off x="3264260" y="1103433"/>
-            <a:ext cx="32671" cy="2830614"/>
+            <a:off x="3295829" y="1103433"/>
+            <a:ext cx="1102" cy="2830614"/>
           </a:xfrm>
           <a:prstGeom prst="straightConnector1">
             <a:avLst/>
@@ -4237,8 +4242,8 @@
         </p:nvCxnSpPr>
         <p:spPr>
           <a:xfrm>
-            <a:off x="4657493" y="5036115"/>
-            <a:ext cx="1440943" cy="237393"/>
+            <a:off x="4680346" y="5035484"/>
+            <a:ext cx="1423506" cy="238129"/>
           </a:xfrm>
           <a:prstGeom prst="straightConnector1">
             <a:avLst/>
@@ -4281,7 +4286,7 @@
         <p:spPr>
           <a:xfrm>
             <a:off x="6273257" y="1099631"/>
-            <a:ext cx="9818" cy="3936484"/>
+            <a:ext cx="15234" cy="3936589"/>
           </a:xfrm>
           <a:prstGeom prst="straightConnector1">
             <a:avLst/>
@@ -4322,8 +4327,8 @@
         </p:nvCxnSpPr>
         <p:spPr>
           <a:xfrm flipH="1">
-            <a:off x="6467713" y="5036115"/>
-            <a:ext cx="1440944" cy="237393"/>
+            <a:off x="6473129" y="5035484"/>
+            <a:ext cx="1418090" cy="238129"/>
           </a:xfrm>
           <a:prstGeom prst="straightConnector1">
             <a:avLst/>
@@ -4361,7 +4366,7 @@
         </p:nvSpPr>
         <p:spPr>
           <a:xfrm>
-            <a:off x="2327347" y="2094124"/>
+            <a:off x="2394648" y="2464758"/>
             <a:ext cx="970330" cy="646331"/>
           </a:xfrm>
           <a:prstGeom prst="rect">
@@ -4403,7 +4408,7 @@
         </p:nvSpPr>
         <p:spPr>
           <a:xfrm>
-            <a:off x="2437783" y="3934047"/>
+            <a:off x="2469352" y="3934047"/>
             <a:ext cx="1652954" cy="781757"/>
           </a:xfrm>
           <a:prstGeom prst="roundRect">
@@ -4467,7 +4472,7 @@
         </p:nvCxnSpPr>
         <p:spPr>
           <a:xfrm>
-            <a:off x="3264260" y="4715804"/>
+            <a:off x="3295829" y="4715804"/>
             <a:ext cx="0" cy="2040910"/>
           </a:xfrm>
           <a:prstGeom prst="line">
@@ -4505,8 +4510,8 @@
         </p:nvCxnSpPr>
         <p:spPr>
           <a:xfrm flipV="1">
-            <a:off x="3272073" y="6752491"/>
-            <a:ext cx="7903406" cy="12170"/>
+            <a:off x="3295829" y="6751271"/>
+            <a:ext cx="7539119" cy="5444"/>
           </a:xfrm>
           <a:prstGeom prst="line">
             <a:avLst/>
@@ -4538,14 +4543,14 @@
           </p:cNvPr>
           <p:cNvCxnSpPr>
             <a:cxnSpLocks/>
-            <a:endCxn id="9" idx="4"/>
+            <a:endCxn id="45" idx="2"/>
           </p:cNvCxnSpPr>
           <p:nvPr/>
         </p:nvCxnSpPr>
         <p:spPr>
           <a:xfrm flipV="1">
-            <a:off x="11175480" y="6371490"/>
-            <a:ext cx="0" cy="388326"/>
+            <a:off x="10834948" y="6470570"/>
+            <a:ext cx="0" cy="280701"/>
           </a:xfrm>
           <a:prstGeom prst="straightConnector1">
             <a:avLst/>
@@ -4583,7 +4588,7 @@
         </p:nvSpPr>
         <p:spPr>
           <a:xfrm>
-            <a:off x="3596539" y="2094124"/>
+            <a:off x="3660580" y="1716680"/>
             <a:ext cx="1109599" cy="923330"/>
           </a:xfrm>
           <a:prstGeom prst="rect">
@@ -4763,8 +4768,8 @@
         </p:nvSpPr>
         <p:spPr>
           <a:xfrm>
-            <a:off x="5074273" y="2489341"/>
-            <a:ext cx="1302729" cy="1200329"/>
+            <a:off x="5135928" y="2496162"/>
+            <a:ext cx="1233030" cy="1200329"/>
           </a:xfrm>
           <a:prstGeom prst="rect">
             <a:avLst/>
@@ -4785,13 +4790,13 @@
           <a:p>
             <a:r>
               <a:rPr lang="en-SG" dirty="0"/>
-              <a:t>is invalid, or</a:t>
+              <a:t>is invalid,</a:t>
             </a:r>
           </a:p>
           <a:p>
             <a:r>
               <a:rPr lang="en-SG" dirty="0"/>
-              <a:t>file does</a:t>
+              <a:t>or file does</a:t>
             </a:r>
           </a:p>
           <a:p>
@@ -4815,13 +4820,14 @@
           <p:cNvCxnSpPr>
             <a:cxnSpLocks/>
             <a:stCxn id="13" idx="3"/>
+            <a:endCxn id="114" idx="1"/>
           </p:cNvCxnSpPr>
           <p:nvPr/>
         </p:nvCxnSpPr>
         <p:spPr>
           <a:xfrm flipV="1">
-            <a:off x="8050806" y="852712"/>
-            <a:ext cx="2302126" cy="9526"/>
+            <a:off x="8050806" y="857057"/>
+            <a:ext cx="1987029" cy="5181"/>
           </a:xfrm>
           <a:prstGeom prst="straightConnector1">
             <a:avLst/>
@@ -4859,7 +4865,7 @@
         </p:nvSpPr>
         <p:spPr>
           <a:xfrm>
-            <a:off x="8488436" y="-31714"/>
+            <a:off x="8124814" y="-31714"/>
             <a:ext cx="2011961" cy="923330"/>
           </a:xfrm>
           <a:prstGeom prst="rect">
@@ -4907,7 +4913,7 @@
         </p:nvSpPr>
         <p:spPr>
           <a:xfrm>
-            <a:off x="10352932" y="521606"/>
+            <a:off x="10037835" y="540534"/>
             <a:ext cx="1548431" cy="633046"/>
           </a:xfrm>
           <a:prstGeom prst="roundRect">
@@ -4966,14 +4972,14 @@
           <p:cNvCxnSpPr>
             <a:cxnSpLocks/>
             <a:stCxn id="114" idx="2"/>
-            <a:endCxn id="9" idx="0"/>
+            <a:endCxn id="45" idx="0"/>
           </p:cNvCxnSpPr>
           <p:nvPr/>
         </p:nvCxnSpPr>
         <p:spPr>
           <a:xfrm>
-            <a:off x="11127148" y="1154652"/>
-            <a:ext cx="48332" cy="4944277"/>
+            <a:off x="10812051" y="1173580"/>
+            <a:ext cx="22897" cy="4822205"/>
           </a:xfrm>
           <a:prstGeom prst="straightConnector1">
             <a:avLst/>
@@ -5061,9 +5067,9 @@
           <p:nvPr/>
         </p:nvCxnSpPr>
         <p:spPr>
-          <a:xfrm flipH="1">
-            <a:off x="4672532" y="1099632"/>
-            <a:ext cx="7814" cy="3954508"/>
+          <a:xfrm>
+            <a:off x="4680346" y="1099632"/>
+            <a:ext cx="0" cy="3935852"/>
           </a:xfrm>
           <a:prstGeom prst="line">
             <a:avLst/>
@@ -5102,11 +5108,107 @@
         <p:spPr>
           <a:xfrm>
             <a:off x="7866168" y="1099630"/>
-            <a:ext cx="42488" cy="3936485"/>
+            <a:ext cx="19635" cy="3936485"/>
           </a:xfrm>
           <a:prstGeom prst="line">
             <a:avLst/>
           </a:prstGeom>
+        </p:spPr>
+        <p:style>
+          <a:lnRef idx="1">
+            <a:schemeClr val="dk1"/>
+          </a:lnRef>
+          <a:fillRef idx="0">
+            <a:schemeClr val="dk1"/>
+          </a:fillRef>
+          <a:effectRef idx="0">
+            <a:schemeClr val="dk1"/>
+          </a:effectRef>
+          <a:fontRef idx="minor">
+            <a:schemeClr val="tx1"/>
+          </a:fontRef>
+        </p:style>
+      </p:cxnSp>
+      <p:sp>
+        <p:nvSpPr>
+          <p:cNvPr id="45" name="Flowchart: Decision 44">
+            <a:extLst>
+              <a:ext uri="{FF2B5EF4-FFF2-40B4-BE49-F238E27FC236}">
+                <a16:creationId xmlns:a16="http://schemas.microsoft.com/office/drawing/2014/main" id="{E5E49447-416A-4D52-A485-DC8142C3EDE5}"/>
+              </a:ext>
+            </a:extLst>
+          </p:cNvPr>
+          <p:cNvSpPr/>
+          <p:nvPr/>
+        </p:nvSpPr>
+        <p:spPr>
+          <a:xfrm>
+            <a:off x="10650309" y="5995785"/>
+            <a:ext cx="369277" cy="474785"/>
+          </a:xfrm>
+          <a:prstGeom prst="flowChartDecision">
+            <a:avLst/>
+          </a:prstGeom>
+          <a:solidFill>
+            <a:schemeClr val="bg1"/>
+          </a:solidFill>
+        </p:spPr>
+        <p:style>
+          <a:lnRef idx="2">
+            <a:schemeClr val="dk1">
+              <a:shade val="50000"/>
+            </a:schemeClr>
+          </a:lnRef>
+          <a:fillRef idx="1">
+            <a:schemeClr val="dk1"/>
+          </a:fillRef>
+          <a:effectRef idx="0">
+            <a:schemeClr val="dk1"/>
+          </a:effectRef>
+          <a:fontRef idx="minor">
+            <a:schemeClr val="lt1"/>
+          </a:fontRef>
+        </p:style>
+        <p:txBody>
+          <a:bodyPr rtlCol="0" anchor="ctr"/>
+          <a:lstStyle/>
+          <a:p>
+            <a:pPr algn="ctr"/>
+            <a:endParaRPr lang="en-GB">
+              <a:solidFill>
+                <a:schemeClr val="tx1"/>
+              </a:solidFill>
+            </a:endParaRPr>
+          </a:p>
+        </p:txBody>
+      </p:sp>
+      <p:cxnSp>
+        <p:nvCxnSpPr>
+          <p:cNvPr id="79" name="Straight Arrow Connector 78">
+            <a:extLst>
+              <a:ext uri="{FF2B5EF4-FFF2-40B4-BE49-F238E27FC236}">
+                <a16:creationId xmlns:a16="http://schemas.microsoft.com/office/drawing/2014/main" id="{05DDD757-3060-4EE8-A295-6AF648BA4051}"/>
+              </a:ext>
+            </a:extLst>
+          </p:cNvPr>
+          <p:cNvCxnSpPr>
+            <a:cxnSpLocks/>
+            <a:stCxn id="45" idx="3"/>
+            <a:endCxn id="9" idx="2"/>
+          </p:cNvCxnSpPr>
+          <p:nvPr/>
+        </p:nvCxnSpPr>
+        <p:spPr>
+          <a:xfrm>
+            <a:off x="11019586" y="6233178"/>
+            <a:ext cx="430399" cy="2032"/>
+          </a:xfrm>
+          <a:prstGeom prst="straightConnector1">
+            <a:avLst/>
+          </a:prstGeom>
+          <a:ln>
+            <a:tailEnd type="triangle"/>
+          </a:ln>
         </p:spPr>
         <p:style>
           <a:lnRef idx="1">

</xml_diff>